<commit_message>
Add FEEDBACK MECHANISM to future scope
</commit_message>
<xml_diff>
--- a/Mindsphere-Hackathon_NPCompete.pptx
+++ b/Mindsphere-Hackathon_NPCompete.pptx
@@ -2231,7 +2231,7 @@
           </a:ln>
           <a:extLst>
             <a:ext uri="{C572A759-6A51-4108-AA02-DFA0A04FC94B}">
-              <ma14:wrappingTextBoxFlag xmlns="" xmlns:ma14="http://schemas.microsoft.com/office/mac/drawingml/2011/main" val="1"/>
+              <ma14:wrappingTextBoxFlag xmlns:ma14="http://schemas.microsoft.com/office/mac/drawingml/2011/main" xmlns="" val="1"/>
             </a:ext>
           </a:extLst>
         </p:spPr>
@@ -2270,7 +2270,7 @@
           </a:ln>
           <a:extLst>
             <a:ext uri="{C572A759-6A51-4108-AA02-DFA0A04FC94B}">
-              <ma14:wrappingTextBoxFlag xmlns="" xmlns:ma14="http://schemas.microsoft.com/office/mac/drawingml/2011/main" val="1"/>
+              <ma14:wrappingTextBoxFlag xmlns:ma14="http://schemas.microsoft.com/office/mac/drawingml/2011/main" xmlns="" val="1"/>
             </a:ext>
           </a:extLst>
         </p:spPr>
@@ -3327,7 +3327,7 @@
           </a:ln>
           <a:extLst>
             <a:ext uri="{C572A759-6A51-4108-AA02-DFA0A04FC94B}">
-              <ma14:wrappingTextBoxFlag xmlns="" xmlns:ma14="http://schemas.microsoft.com/office/mac/drawingml/2011/main" val="1"/>
+              <ma14:wrappingTextBoxFlag xmlns:ma14="http://schemas.microsoft.com/office/mac/drawingml/2011/main" xmlns="" val="1"/>
             </a:ext>
           </a:extLst>
         </p:spPr>
@@ -3408,7 +3408,7 @@
           </a:ln>
           <a:extLst>
             <a:ext uri="{C572A759-6A51-4108-AA02-DFA0A04FC94B}">
-              <ma14:wrappingTextBoxFlag xmlns="" xmlns:ma14="http://schemas.microsoft.com/office/mac/drawingml/2011/main" val="1"/>
+              <ma14:wrappingTextBoxFlag xmlns:ma14="http://schemas.microsoft.com/office/mac/drawingml/2011/main" xmlns="" val="1"/>
             </a:ext>
           </a:extLst>
         </p:spPr>
@@ -4496,7 +4496,7 @@
           </a:prstGeom>
           <a:extLst>
             <a:ext uri="{C572A759-6A51-4108-AA02-DFA0A04FC94B}">
-              <ma14:wrappingTextBoxFlag xmlns="" xmlns:ma14="http://schemas.microsoft.com/office/mac/drawingml/2011/main" val="1"/>
+              <ma14:wrappingTextBoxFlag xmlns:ma14="http://schemas.microsoft.com/office/mac/drawingml/2011/main" xmlns="" val="1"/>
             </a:ext>
           </a:extLst>
         </p:spPr>
@@ -4685,7 +4685,7 @@
           </a:ln>
           <a:extLst>
             <a:ext uri="{C572A759-6A51-4108-AA02-DFA0A04FC94B}">
-              <ma14:wrappingTextBoxFlag xmlns="" xmlns:ma14="http://schemas.microsoft.com/office/mac/drawingml/2011/main" val="1"/>
+              <ma14:wrappingTextBoxFlag xmlns:ma14="http://schemas.microsoft.com/office/mac/drawingml/2011/main" xmlns="" val="1"/>
             </a:ext>
           </a:extLst>
         </p:spPr>
@@ -4851,7 +4851,7 @@
           </a:ln>
           <a:extLst>
             <a:ext uri="{C572A759-6A51-4108-AA02-DFA0A04FC94B}">
-              <ma14:wrappingTextBoxFlag xmlns="" xmlns:ma14="http://schemas.microsoft.com/office/mac/drawingml/2011/main" val="1"/>
+              <ma14:wrappingTextBoxFlag xmlns:ma14="http://schemas.microsoft.com/office/mac/drawingml/2011/main" xmlns="" val="1"/>
             </a:ext>
           </a:extLst>
         </p:spPr>
@@ -4927,7 +4927,7 @@
           </a:ln>
           <a:extLst>
             <a:ext uri="{C572A759-6A51-4108-AA02-DFA0A04FC94B}">
-              <ma14:wrappingTextBoxFlag xmlns="" xmlns:ma14="http://schemas.microsoft.com/office/mac/drawingml/2011/main" val="1"/>
+              <ma14:wrappingTextBoxFlag xmlns:ma14="http://schemas.microsoft.com/office/mac/drawingml/2011/main" xmlns="" val="1"/>
             </a:ext>
           </a:extLst>
         </p:spPr>
@@ -4967,7 +4967,7 @@
           </a:ln>
           <a:extLst>
             <a:ext uri="{C572A759-6A51-4108-AA02-DFA0A04FC94B}">
-              <ma14:wrappingTextBoxFlag xmlns="" xmlns:ma14="http://schemas.microsoft.com/office/mac/drawingml/2011/main" val="1"/>
+              <ma14:wrappingTextBoxFlag xmlns:ma14="http://schemas.microsoft.com/office/mac/drawingml/2011/main" xmlns="" val="1"/>
             </a:ext>
           </a:extLst>
         </p:spPr>
@@ -5055,7 +5055,7 @@
           </a:ln>
           <a:extLst>
             <a:ext uri="{C572A759-6A51-4108-AA02-DFA0A04FC94B}">
-              <ma14:wrappingTextBoxFlag xmlns="" xmlns:ma14="http://schemas.microsoft.com/office/mac/drawingml/2011/main" val="1"/>
+              <ma14:wrappingTextBoxFlag xmlns:ma14="http://schemas.microsoft.com/office/mac/drawingml/2011/main" xmlns="" val="1"/>
             </a:ext>
           </a:extLst>
         </p:spPr>
@@ -5211,7 +5211,7 @@
           </a:prstGeom>
           <a:extLst>
             <a:ext uri="{C572A759-6A51-4108-AA02-DFA0A04FC94B}">
-              <ma14:wrappingTextBoxFlag xmlns="" xmlns:ma14="http://schemas.microsoft.com/office/mac/drawingml/2011/main" val="1"/>
+              <ma14:wrappingTextBoxFlag xmlns:ma14="http://schemas.microsoft.com/office/mac/drawingml/2011/main" xmlns="" val="1"/>
             </a:ext>
           </a:extLst>
         </p:spPr>
@@ -5350,7 +5350,7 @@
           </a:ln>
           <a:extLst>
             <a:ext uri="{C572A759-6A51-4108-AA02-DFA0A04FC94B}">
-              <ma14:wrappingTextBoxFlag xmlns="" xmlns:ma14="http://schemas.microsoft.com/office/mac/drawingml/2011/main" val="1"/>
+              <ma14:wrappingTextBoxFlag xmlns:ma14="http://schemas.microsoft.com/office/mac/drawingml/2011/main" xmlns="" val="1"/>
             </a:ext>
           </a:extLst>
         </p:spPr>
@@ -5426,7 +5426,7 @@
           </a:ln>
           <a:extLst>
             <a:ext uri="{C572A759-6A51-4108-AA02-DFA0A04FC94B}">
-              <ma14:wrappingTextBoxFlag xmlns="" xmlns:ma14="http://schemas.microsoft.com/office/mac/drawingml/2011/main" val="1"/>
+              <ma14:wrappingTextBoxFlag xmlns:ma14="http://schemas.microsoft.com/office/mac/drawingml/2011/main" xmlns="" val="1"/>
             </a:ext>
           </a:extLst>
         </p:spPr>
@@ -5517,7 +5517,7 @@
           </a:prstGeom>
           <a:extLst>
             <a:ext uri="{C572A759-6A51-4108-AA02-DFA0A04FC94B}">
-              <ma14:wrappingTextBoxFlag xmlns="" xmlns:ma14="http://schemas.microsoft.com/office/mac/drawingml/2011/main" val="1"/>
+              <ma14:wrappingTextBoxFlag xmlns:ma14="http://schemas.microsoft.com/office/mac/drawingml/2011/main" xmlns="" val="1"/>
             </a:ext>
           </a:extLst>
         </p:spPr>
@@ -5656,7 +5656,7 @@
           </a:ln>
           <a:extLst>
             <a:ext uri="{C572A759-6A51-4108-AA02-DFA0A04FC94B}">
-              <ma14:wrappingTextBoxFlag xmlns="" xmlns:ma14="http://schemas.microsoft.com/office/mac/drawingml/2011/main" val="1"/>
+              <ma14:wrappingTextBoxFlag xmlns:ma14="http://schemas.microsoft.com/office/mac/drawingml/2011/main" xmlns="" val="1"/>
             </a:ext>
           </a:extLst>
         </p:spPr>
@@ -5732,7 +5732,7 @@
           </a:ln>
           <a:extLst>
             <a:ext uri="{C572A759-6A51-4108-AA02-DFA0A04FC94B}">
-              <ma14:wrappingTextBoxFlag xmlns="" xmlns:ma14="http://schemas.microsoft.com/office/mac/drawingml/2011/main" val="1"/>
+              <ma14:wrappingTextBoxFlag xmlns:ma14="http://schemas.microsoft.com/office/mac/drawingml/2011/main" xmlns="" val="1"/>
             </a:ext>
           </a:extLst>
         </p:spPr>
@@ -5939,7 +5939,7 @@
           </a:ln>
           <a:extLst>
             <a:ext uri="{C572A759-6A51-4108-AA02-DFA0A04FC94B}">
-              <ma14:wrappingTextBoxFlag xmlns="" xmlns:ma14="http://schemas.microsoft.com/office/mac/drawingml/2011/main" val="1"/>
+              <ma14:wrappingTextBoxFlag xmlns:ma14="http://schemas.microsoft.com/office/mac/drawingml/2011/main" xmlns="" val="1"/>
             </a:ext>
           </a:extLst>
         </p:spPr>
@@ -6015,7 +6015,7 @@
           </a:ln>
           <a:extLst>
             <a:ext uri="{C572A759-6A51-4108-AA02-DFA0A04FC94B}">
-              <ma14:wrappingTextBoxFlag xmlns="" xmlns:ma14="http://schemas.microsoft.com/office/mac/drawingml/2011/main" val="1"/>
+              <ma14:wrappingTextBoxFlag xmlns:ma14="http://schemas.microsoft.com/office/mac/drawingml/2011/main" xmlns="" val="1"/>
             </a:ext>
           </a:extLst>
         </p:spPr>
@@ -6533,7 +6533,7 @@
           </a:ln>
           <a:extLst>
             <a:ext uri="{C572A759-6A51-4108-AA02-DFA0A04FC94B}">
-              <ma14:wrappingTextBoxFlag xmlns="" xmlns:ma14="http://schemas.microsoft.com/office/mac/drawingml/2011/main" val="1"/>
+              <ma14:wrappingTextBoxFlag xmlns:ma14="http://schemas.microsoft.com/office/mac/drawingml/2011/main" xmlns="" val="1"/>
             </a:ext>
           </a:extLst>
         </p:spPr>
@@ -6609,7 +6609,7 @@
           </a:ln>
           <a:extLst>
             <a:ext uri="{C572A759-6A51-4108-AA02-DFA0A04FC94B}">
-              <ma14:wrappingTextBoxFlag xmlns="" xmlns:ma14="http://schemas.microsoft.com/office/mac/drawingml/2011/main" val="1"/>
+              <ma14:wrappingTextBoxFlag xmlns:ma14="http://schemas.microsoft.com/office/mac/drawingml/2011/main" xmlns="" val="1"/>
             </a:ext>
           </a:extLst>
         </p:spPr>
@@ -7004,7 +7004,7 @@
           </a:ln>
           <a:extLst>
             <a:ext uri="{C572A759-6A51-4108-AA02-DFA0A04FC94B}">
-              <ma14:wrappingTextBoxFlag xmlns="" xmlns:ma14="http://schemas.microsoft.com/office/mac/drawingml/2011/main" val="1"/>
+              <ma14:wrappingTextBoxFlag xmlns:ma14="http://schemas.microsoft.com/office/mac/drawingml/2011/main" xmlns="" val="1"/>
             </a:ext>
           </a:extLst>
         </p:spPr>
@@ -7080,7 +7080,7 @@
           </a:ln>
           <a:extLst>
             <a:ext uri="{C572A759-6A51-4108-AA02-DFA0A04FC94B}">
-              <ma14:wrappingTextBoxFlag xmlns="" xmlns:ma14="http://schemas.microsoft.com/office/mac/drawingml/2011/main" val="1"/>
+              <ma14:wrappingTextBoxFlag xmlns:ma14="http://schemas.microsoft.com/office/mac/drawingml/2011/main" xmlns="" val="1"/>
             </a:ext>
           </a:extLst>
         </p:spPr>
@@ -7407,7 +7407,7 @@
           </a:ln>
           <a:extLst>
             <a:ext uri="{C572A759-6A51-4108-AA02-DFA0A04FC94B}">
-              <ma14:wrappingTextBoxFlag xmlns="" xmlns:ma14="http://schemas.microsoft.com/office/mac/drawingml/2011/main" val="1"/>
+              <ma14:wrappingTextBoxFlag xmlns:ma14="http://schemas.microsoft.com/office/mac/drawingml/2011/main" xmlns="" val="1"/>
             </a:ext>
           </a:extLst>
         </p:spPr>
@@ -7483,7 +7483,7 @@
           </a:ln>
           <a:extLst>
             <a:ext uri="{C572A759-6A51-4108-AA02-DFA0A04FC94B}">
-              <ma14:wrappingTextBoxFlag xmlns="" xmlns:ma14="http://schemas.microsoft.com/office/mac/drawingml/2011/main" val="1"/>
+              <ma14:wrappingTextBoxFlag xmlns:ma14="http://schemas.microsoft.com/office/mac/drawingml/2011/main" xmlns="" val="1"/>
             </a:ext>
           </a:extLst>
         </p:spPr>
@@ -7519,7 +7519,7 @@
         <p:spPr>
           <a:xfrm>
             <a:off x="1463390" y="2090174"/>
-            <a:ext cx="8687982" cy="3462482"/>
+            <a:ext cx="8687982" cy="3831814"/>
           </a:xfrm>
           <a:prstGeom prst="rect">
             <a:avLst/>
@@ -7704,8 +7704,13 @@
             </a:r>
             <a:r>
               <a:rPr lang="en-IN" sz="2400" dirty="0"/>
-              <a:t>with the sensors of acetabular reamer</a:t>
-            </a:r>
+              <a:t>with the sensors of acetabular reamer, with an efficient </a:t>
+            </a:r>
+            <a:r>
+              <a:rPr lang="en-IN" sz="2400"/>
+              <a:t>feed-back mechanism</a:t>
+            </a:r>
+            <a:endParaRPr lang="en-IN" sz="2400" dirty="0"/>
           </a:p>
           <a:p>
             <a:pPr marR="0" algn="l" defTabSz="914400" rtl="0" fontAlgn="auto" latinLnBrk="0" hangingPunct="0">
@@ -7900,7 +7905,7 @@
           </a:ln>
           <a:extLst>
             <a:ext uri="{C572A759-6A51-4108-AA02-DFA0A04FC94B}">
-              <ma14:wrappingTextBoxFlag xmlns="" xmlns:ma14="http://schemas.microsoft.com/office/mac/drawingml/2011/main" val="1"/>
+              <ma14:wrappingTextBoxFlag xmlns:ma14="http://schemas.microsoft.com/office/mac/drawingml/2011/main" xmlns="" val="1"/>
             </a:ext>
           </a:extLst>
         </p:spPr>
@@ -7976,7 +7981,7 @@
           </a:ln>
           <a:extLst>
             <a:ext uri="{C572A759-6A51-4108-AA02-DFA0A04FC94B}">
-              <ma14:wrappingTextBoxFlag xmlns="" xmlns:ma14="http://schemas.microsoft.com/office/mac/drawingml/2011/main" val="1"/>
+              <ma14:wrappingTextBoxFlag xmlns:ma14="http://schemas.microsoft.com/office/mac/drawingml/2011/main" xmlns="" val="1"/>
             </a:ext>
           </a:extLst>
         </p:spPr>

</xml_diff>